<commit_message>
Added confounding lecture (but needs style correction) and explanations of 95% CI to categorical lecture.
</commit_message>
<xml_diff>
--- a/Lecture 7 - Cat LM/slides/Lecture 5.1 LM with categorical.pptx
+++ b/Lecture 7 - Cat LM/slides/Lecture 5.1 LM with categorical.pptx
@@ -5,7 +5,7 @@
     <p:sldMasterId id="2147483660" r:id="rId1"/>
   </p:sldMasterIdLst>
   <p:notesMasterIdLst>
-    <p:notesMasterId r:id="rId27"/>
+    <p:notesMasterId r:id="rId30"/>
   </p:notesMasterIdLst>
   <p:sldIdLst>
     <p:sldId id="257" r:id="rId2"/>
@@ -29,10 +29,13 @@
     <p:sldId id="327" r:id="rId20"/>
     <p:sldId id="329" r:id="rId21"/>
     <p:sldId id="331" r:id="rId22"/>
-    <p:sldId id="332" r:id="rId23"/>
-    <p:sldId id="320" r:id="rId24"/>
-    <p:sldId id="330" r:id="rId25"/>
-    <p:sldId id="302" r:id="rId26"/>
+    <p:sldId id="333" r:id="rId23"/>
+    <p:sldId id="334" r:id="rId24"/>
+    <p:sldId id="335" r:id="rId25"/>
+    <p:sldId id="332" r:id="rId26"/>
+    <p:sldId id="320" r:id="rId27"/>
+    <p:sldId id="330" r:id="rId28"/>
+    <p:sldId id="302" r:id="rId29"/>
   </p:sldIdLst>
   <p:sldSz cx="12192000" cy="6858000"/>
   <p:notesSz cx="6858000" cy="9144000"/>
@@ -221,7 +224,7 @@
           <a:p>
             <a:fld id="{19306761-C467-451A-B631-B83A8FB7E2AD}" type="datetimeFigureOut">
               <a:rPr lang="en-GB" smtClean="0"/>
-              <a:t>23/07/2024</a:t>
+              <a:t>29/07/2024</a:t>
             </a:fld>
             <a:endParaRPr lang="en-GB"/>
           </a:p>
@@ -554,7 +557,7 @@
           <a:p>
             <a:fld id="{80DA05D5-BE59-48F1-821C-F6C56F891EAA}" type="slidenum">
               <a:rPr lang="en-GB" smtClean="0"/>
-              <a:t>22</a:t>
+              <a:t>25</a:t>
             </a:fld>
             <a:endParaRPr lang="en-GB"/>
           </a:p>
@@ -638,7 +641,7 @@
           <a:p>
             <a:fld id="{80DA05D5-BE59-48F1-821C-F6C56F891EAA}" type="slidenum">
               <a:rPr lang="en-GB" smtClean="0"/>
-              <a:t>24</a:t>
+              <a:t>27</a:t>
             </a:fld>
             <a:endParaRPr lang="en-GB"/>
           </a:p>
@@ -998,7 +1001,7 @@
           <a:p>
             <a:fld id="{7EE9FA64-2165-4ED8-BB13-AC16E72ED8FC}" type="datetimeFigureOut">
               <a:rPr lang="en-GB" smtClean="0"/>
-              <a:t>23/07/2024</a:t>
+              <a:t>29/07/2024</a:t>
             </a:fld>
             <a:endParaRPr lang="en-GB"/>
           </a:p>
@@ -1208,7 +1211,7 @@
           <a:p>
             <a:fld id="{7EE9FA64-2165-4ED8-BB13-AC16E72ED8FC}" type="datetimeFigureOut">
               <a:rPr lang="en-GB" smtClean="0"/>
-              <a:t>23/07/2024</a:t>
+              <a:t>29/07/2024</a:t>
             </a:fld>
             <a:endParaRPr lang="en-GB"/>
           </a:p>
@@ -1430,7 +1433,7 @@
           <a:p>
             <a:fld id="{7EE9FA64-2165-4ED8-BB13-AC16E72ED8FC}" type="datetimeFigureOut">
               <a:rPr lang="en-GB" smtClean="0"/>
-              <a:t>23/07/2024</a:t>
+              <a:t>29/07/2024</a:t>
             </a:fld>
             <a:endParaRPr lang="en-GB"/>
           </a:p>
@@ -1612,7 +1615,7 @@
           <a:p>
             <a:fld id="{A5C66AAF-4858-49E9-B86B-FBFED3DD34F6}" type="datetimeFigureOut">
               <a:rPr lang="en-GB" smtClean="0"/>
-              <a:t>23/07/2024</a:t>
+              <a:t>29/07/2024</a:t>
             </a:fld>
             <a:endParaRPr lang="en-GB"/>
           </a:p>
@@ -2539,7 +2542,7 @@
           <a:p>
             <a:fld id="{7EE9FA64-2165-4ED8-BB13-AC16E72ED8FC}" type="datetimeFigureOut">
               <a:rPr lang="en-GB" smtClean="0"/>
-              <a:t>23/07/2024</a:t>
+              <a:t>29/07/2024</a:t>
             </a:fld>
             <a:endParaRPr lang="en-GB"/>
           </a:p>
@@ -2681,7 +2684,7 @@
           <a:p>
             <a:fld id="{7EE9FA64-2165-4ED8-BB13-AC16E72ED8FC}" type="datetimeFigureOut">
               <a:rPr lang="en-GB" smtClean="0"/>
-              <a:t>23/07/2024</a:t>
+              <a:t>29/07/2024</a:t>
             </a:fld>
             <a:endParaRPr lang="en-GB"/>
           </a:p>
@@ -2794,7 +2797,7 @@
           <a:p>
             <a:fld id="{7EE9FA64-2165-4ED8-BB13-AC16E72ED8FC}" type="datetimeFigureOut">
               <a:rPr lang="en-GB" smtClean="0"/>
-              <a:t>23/07/2024</a:t>
+              <a:t>29/07/2024</a:t>
             </a:fld>
             <a:endParaRPr lang="en-GB"/>
           </a:p>
@@ -3107,7 +3110,7 @@
           <a:p>
             <a:fld id="{7EE9FA64-2165-4ED8-BB13-AC16E72ED8FC}" type="datetimeFigureOut">
               <a:rPr lang="en-GB" smtClean="0"/>
-              <a:t>23/07/2024</a:t>
+              <a:t>29/07/2024</a:t>
             </a:fld>
             <a:endParaRPr lang="en-GB"/>
           </a:p>
@@ -3400,7 +3403,7 @@
           <a:p>
             <a:fld id="{7EE9FA64-2165-4ED8-BB13-AC16E72ED8FC}" type="datetimeFigureOut">
               <a:rPr lang="en-GB" smtClean="0"/>
-              <a:t>23/07/2024</a:t>
+              <a:t>29/07/2024</a:t>
             </a:fld>
             <a:endParaRPr lang="en-GB"/>
           </a:p>
@@ -3643,7 +3646,7 @@
           <a:p>
             <a:fld id="{7EE9FA64-2165-4ED8-BB13-AC16E72ED8FC}" type="datetimeFigureOut">
               <a:rPr lang="en-GB" smtClean="0"/>
-              <a:t>23/07/2024</a:t>
+              <a:t>29/07/2024</a:t>
             </a:fld>
             <a:endParaRPr lang="en-GB"/>
           </a:p>
@@ -4188,8 +4191,8 @@
           </a:p>
         </p:txBody>
       </p:sp>
-      <mc:AlternateContent xmlns:mc="http://schemas.openxmlformats.org/markup-compatibility/2006">
-        <mc:Choice xmlns:a14="http://schemas.microsoft.com/office/drawing/2010/main" Requires="a14">
+      <mc:AlternateContent xmlns:mc="http://schemas.openxmlformats.org/markup-compatibility/2006" xmlns:a14="http://schemas.microsoft.com/office/drawing/2010/main">
+        <mc:Choice Requires="a14">
           <p:sp>
             <p:nvSpPr>
               <p:cNvPr id="3" name="Content Placeholder 2">
@@ -4545,7 +4548,7 @@
             </p:txBody>
           </p:sp>
         </mc:Choice>
-        <mc:Fallback>
+        <mc:Fallback xmlns="">
           <p:sp>
             <p:nvSpPr>
               <p:cNvPr id="3" name="Content Placeholder 2">
@@ -6342,8 +6345,8 @@
           </a:p>
         </p:txBody>
       </p:sp>
-      <mc:AlternateContent xmlns:mc="http://schemas.openxmlformats.org/markup-compatibility/2006">
-        <mc:Choice xmlns:a14="http://schemas.microsoft.com/office/drawing/2010/main" Requires="a14">
+      <mc:AlternateContent xmlns:mc="http://schemas.openxmlformats.org/markup-compatibility/2006" xmlns:a14="http://schemas.microsoft.com/office/drawing/2010/main">
+        <mc:Choice Requires="a14">
           <p:sp>
             <p:nvSpPr>
               <p:cNvPr id="10" name="TextBox 9">
@@ -6515,7 +6518,7 @@
             </p:txBody>
           </p:sp>
         </mc:Choice>
-        <mc:Fallback>
+        <mc:Fallback xmlns="">
           <p:sp>
             <p:nvSpPr>
               <p:cNvPr id="10" name="TextBox 9">
@@ -6618,8 +6621,8 @@
           </a:p>
         </p:txBody>
       </p:sp>
-      <mc:AlternateContent xmlns:mc="http://schemas.openxmlformats.org/markup-compatibility/2006">
-        <mc:Choice xmlns:a14="http://schemas.microsoft.com/office/drawing/2010/main" Requires="a14">
+      <mc:AlternateContent xmlns:mc="http://schemas.openxmlformats.org/markup-compatibility/2006" xmlns:a14="http://schemas.microsoft.com/office/drawing/2010/main">
+        <mc:Choice Requires="a14">
           <p:sp>
             <p:nvSpPr>
               <p:cNvPr id="15" name="TextBox 14">
@@ -6791,7 +6794,7 @@
             </p:txBody>
           </p:sp>
         </mc:Choice>
-        <mc:Fallback>
+        <mc:Fallback xmlns="">
           <p:sp>
             <p:nvSpPr>
               <p:cNvPr id="15" name="TextBox 14">
@@ -6989,8 +6992,8 @@
           </p:sp>
         </mc:Fallback>
       </mc:AlternateContent>
-      <mc:AlternateContent xmlns:mc="http://schemas.openxmlformats.org/markup-compatibility/2006">
-        <mc:Choice xmlns:a14="http://schemas.microsoft.com/office/drawing/2010/main" Requires="a14">
+      <mc:AlternateContent xmlns:mc="http://schemas.openxmlformats.org/markup-compatibility/2006" xmlns:a14="http://schemas.microsoft.com/office/drawing/2010/main">
+        <mc:Choice Requires="a14">
           <p:sp>
             <p:nvSpPr>
               <p:cNvPr id="3" name="Content Placeholder 2">
@@ -7101,7 +7104,7 @@
             </p:txBody>
           </p:sp>
         </mc:Choice>
-        <mc:Fallback>
+        <mc:Fallback xmlns="">
           <p:sp>
             <p:nvSpPr>
               <p:cNvPr id="3" name="Content Placeholder 2">
@@ -9186,8 +9189,8 @@
           </p:sp>
         </mc:Fallback>
       </mc:AlternateContent>
-      <mc:AlternateContent xmlns:mc="http://schemas.openxmlformats.org/markup-compatibility/2006">
-        <mc:Choice xmlns:a14="http://schemas.microsoft.com/office/drawing/2010/main" Requires="a14">
+      <mc:AlternateContent xmlns:mc="http://schemas.openxmlformats.org/markup-compatibility/2006" xmlns:a14="http://schemas.microsoft.com/office/drawing/2010/main">
+        <mc:Choice Requires="a14">
           <p:sp>
             <p:nvSpPr>
               <p:cNvPr id="12" name="Content Placeholder 2">
@@ -9524,7 +9527,7 @@
             </p:txBody>
           </p:sp>
         </mc:Choice>
-        <mc:Fallback>
+        <mc:Fallback xmlns="">
           <p:sp>
             <p:nvSpPr>
               <p:cNvPr id="12" name="Content Placeholder 2">
@@ -12974,8 +12977,8 @@
           </a:p>
         </p:txBody>
       </p:sp>
-      <mc:AlternateContent xmlns:mc="http://schemas.openxmlformats.org/markup-compatibility/2006">
-        <mc:Choice xmlns:a14="http://schemas.microsoft.com/office/drawing/2010/main" Requires="a14">
+      <mc:AlternateContent xmlns:mc="http://schemas.openxmlformats.org/markup-compatibility/2006" xmlns:a14="http://schemas.microsoft.com/office/drawing/2010/main">
+        <mc:Choice Requires="a14">
           <p:sp>
             <p:nvSpPr>
               <p:cNvPr id="3" name="Content Placeholder 2">
@@ -13218,7 +13221,7 @@
             </p:txBody>
           </p:sp>
         </mc:Choice>
-        <mc:Fallback>
+        <mc:Fallback xmlns="">
           <p:sp>
             <p:nvSpPr>
               <p:cNvPr id="3" name="Content Placeholder 2">
@@ -15901,8 +15904,8 @@
           </a:p>
         </p:txBody>
       </p:sp>
-      <mc:AlternateContent xmlns:mc="http://schemas.openxmlformats.org/markup-compatibility/2006">
-        <mc:Choice xmlns:a14="http://schemas.microsoft.com/office/drawing/2010/main" Requires="a14">
+      <mc:AlternateContent xmlns:mc="http://schemas.openxmlformats.org/markup-compatibility/2006" xmlns:a14="http://schemas.microsoft.com/office/drawing/2010/main">
+        <mc:Choice Requires="a14">
           <p:sp>
             <p:nvSpPr>
               <p:cNvPr id="3" name="Content Placeholder 2">
@@ -16277,7 +16280,7 @@
             </p:txBody>
           </p:sp>
         </mc:Choice>
-        <mc:Fallback>
+        <mc:Fallback xmlns="">
           <p:sp>
             <p:nvSpPr>
               <p:cNvPr id="3" name="Content Placeholder 2">
@@ -17455,8 +17458,8 @@
           </a:p>
         </p:txBody>
       </p:sp>
-      <mc:AlternateContent xmlns:mc="http://schemas.openxmlformats.org/markup-compatibility/2006">
-        <mc:Choice xmlns:a14="http://schemas.microsoft.com/office/drawing/2010/main" Requires="a14">
+      <mc:AlternateContent xmlns:mc="http://schemas.openxmlformats.org/markup-compatibility/2006" xmlns:a14="http://schemas.microsoft.com/office/drawing/2010/main">
+        <mc:Choice Requires="a14">
           <p:sp>
             <p:nvSpPr>
               <p:cNvPr id="12" name="Content Placeholder 2">
@@ -18138,7 +18141,7 @@
             </p:txBody>
           </p:sp>
         </mc:Choice>
-        <mc:Fallback>
+        <mc:Fallback xmlns="">
           <p:sp>
             <p:nvSpPr>
               <p:cNvPr id="12" name="Content Placeholder 2">
@@ -18778,6 +18781,1606 @@
 </file>
 
 <file path=ppt/slides/slide22.xml><?xml version="1.0" encoding="utf-8"?>
+<p:sld xmlns:a="http://schemas.openxmlformats.org/drawingml/2006/main" xmlns:r="http://schemas.openxmlformats.org/officeDocument/2006/relationships" xmlns:p="http://schemas.openxmlformats.org/presentationml/2006/main">
+  <p:cSld>
+    <p:spTree>
+      <p:nvGrpSpPr>
+        <p:cNvPr id="1" name=""/>
+        <p:cNvGrpSpPr/>
+        <p:nvPr/>
+      </p:nvGrpSpPr>
+      <p:grpSpPr>
+        <a:xfrm>
+          <a:off x="0" y="0"/>
+          <a:ext cx="0" cy="0"/>
+          <a:chOff x="0" y="0"/>
+          <a:chExt cx="0" cy="0"/>
+        </a:xfrm>
+      </p:grpSpPr>
+      <p:sp>
+        <p:nvSpPr>
+          <p:cNvPr id="2" name="Title 1">
+            <a:extLst>
+              <a:ext uri="{FF2B5EF4-FFF2-40B4-BE49-F238E27FC236}">
+                <a16:creationId xmlns:a16="http://schemas.microsoft.com/office/drawing/2014/main" id="{07AAEE6A-F45C-53E3-719E-F362797EB12A}"/>
+              </a:ext>
+            </a:extLst>
+          </p:cNvPr>
+          <p:cNvSpPr>
+            <a:spLocks noGrp="1"/>
+          </p:cNvSpPr>
+          <p:nvPr>
+            <p:ph type="title"/>
+          </p:nvPr>
+        </p:nvSpPr>
+        <p:spPr/>
+        <p:txBody>
+          <a:bodyPr/>
+          <a:lstStyle/>
+          <a:p>
+            <a:r>
+              <a:rPr lang="en-GB" dirty="0"/>
+              <a:t>What are confidence intervals?</a:t>
+            </a:r>
+          </a:p>
+        </p:txBody>
+      </p:sp>
+      <p:sp>
+        <p:nvSpPr>
+          <p:cNvPr id="3" name="Content Placeholder 2">
+            <a:extLst>
+              <a:ext uri="{FF2B5EF4-FFF2-40B4-BE49-F238E27FC236}">
+                <a16:creationId xmlns:a16="http://schemas.microsoft.com/office/drawing/2014/main" id="{473BA654-9E5C-B520-07C5-B4D372EE2424}"/>
+              </a:ext>
+            </a:extLst>
+          </p:cNvPr>
+          <p:cNvSpPr>
+            <a:spLocks noGrp="1"/>
+          </p:cNvSpPr>
+          <p:nvPr>
+            <p:ph idx="1"/>
+          </p:nvPr>
+        </p:nvSpPr>
+        <p:spPr/>
+        <p:txBody>
+          <a:bodyPr>
+            <a:normAutofit fontScale="92500" lnSpcReduction="20000"/>
+          </a:bodyPr>
+          <a:lstStyle/>
+          <a:p>
+            <a:r>
+              <a:rPr lang="en-GB" dirty="0"/>
+              <a:t>Ring toss game</a:t>
+            </a:r>
+          </a:p>
+          <a:p>
+            <a:pPr lvl="1"/>
+            <a:r>
+              <a:rPr lang="en-GB" dirty="0"/>
+              <a:t>You’ve practiced your whole life, such that you have a 95% chance of getting the hoop on the post</a:t>
+            </a:r>
+          </a:p>
+          <a:p>
+            <a:pPr lvl="1"/>
+            <a:r>
+              <a:rPr lang="en-GB" dirty="0"/>
+              <a:t>However, once the hoop has landed, it either overlaps the post or not</a:t>
+            </a:r>
+          </a:p>
+          <a:p>
+            <a:r>
+              <a:rPr lang="en-GB" dirty="0"/>
+              <a:t>This is the same as a 95% CI</a:t>
+            </a:r>
+          </a:p>
+          <a:p>
+            <a:pPr lvl="1"/>
+            <a:r>
+              <a:rPr lang="en-GB" dirty="0"/>
+              <a:t>Before you run the model, you have a 95% chance of overlapping the true parameter value</a:t>
+            </a:r>
+          </a:p>
+          <a:p>
+            <a:pPr lvl="1"/>
+            <a:r>
+              <a:rPr lang="en-GB" dirty="0"/>
+              <a:t>However, once you’ve run the model, the 95% CI either contains the true value or not</a:t>
+            </a:r>
+          </a:p>
+          <a:p>
+            <a:r>
+              <a:rPr lang="en-GB" dirty="0"/>
+              <a:t>If we could rewind time and rerun the data collection and analysis 100 times, we’d be able to figure out the most likely range of the true value</a:t>
+            </a:r>
+          </a:p>
+          <a:p>
+            <a:pPr lvl="1"/>
+            <a:r>
+              <a:rPr lang="en-GB" dirty="0"/>
+              <a:t>But if we only throw it once, we can’t</a:t>
+            </a:r>
+          </a:p>
+        </p:txBody>
+      </p:sp>
+      <p:pic>
+        <p:nvPicPr>
+          <p:cNvPr id="6" name="Picture Placeholder 5" descr="A hand holding a ring&#10;&#10;Description automatically generated">
+            <a:extLst>
+              <a:ext uri="{FF2B5EF4-FFF2-40B4-BE49-F238E27FC236}">
+                <a16:creationId xmlns:a16="http://schemas.microsoft.com/office/drawing/2014/main" id="{80D7A350-8BF0-B43E-4A83-32CA4C9827AC}"/>
+              </a:ext>
+            </a:extLst>
+          </p:cNvPr>
+          <p:cNvPicPr>
+            <a:picLocks noGrp="1" noChangeAspect="1"/>
+          </p:cNvPicPr>
+          <p:nvPr>
+            <p:ph type="pic" sz="quarter" idx="10"/>
+          </p:nvPr>
+        </p:nvPicPr>
+        <p:blipFill rotWithShape="1">
+          <a:blip r:embed="rId2">
+            <a:extLst>
+              <a:ext uri="{28A0092B-C50C-407E-A947-70E740481C1C}">
+                <a14:useLocalDpi xmlns:a14="http://schemas.microsoft.com/office/drawing/2010/main" val="0"/>
+              </a:ext>
+            </a:extLst>
+          </a:blip>
+          <a:srcRect l="-257" t="-32794" r="-404" b="-24858"/>
+          <a:stretch/>
+        </p:blipFill>
+        <p:spPr>
+          <a:xfrm>
+            <a:off x="6359525" y="0"/>
+            <a:ext cx="5832475" cy="6858000"/>
+          </a:xfrm>
+        </p:spPr>
+      </p:pic>
+    </p:spTree>
+    <p:extLst>
+      <p:ext uri="{BB962C8B-B14F-4D97-AF65-F5344CB8AC3E}">
+        <p14:creationId xmlns:p14="http://schemas.microsoft.com/office/powerpoint/2010/main" val="1657289615"/>
+      </p:ext>
+    </p:extLst>
+  </p:cSld>
+  <p:clrMapOvr>
+    <a:masterClrMapping/>
+  </p:clrMapOvr>
+  <p:timing>
+    <p:tnLst>
+      <p:par>
+        <p:cTn id="1" dur="indefinite" restart="never" nodeType="tmRoot">
+          <p:childTnLst>
+            <p:seq concurrent="1" nextAc="seek">
+              <p:cTn id="2" dur="indefinite" nodeType="mainSeq">
+                <p:childTnLst>
+                  <p:par>
+                    <p:cTn id="3" fill="hold">
+                      <p:stCondLst>
+                        <p:cond delay="indefinite"/>
+                      </p:stCondLst>
+                      <p:childTnLst>
+                        <p:par>
+                          <p:cTn id="4" fill="hold">
+                            <p:stCondLst>
+                              <p:cond delay="0"/>
+                            </p:stCondLst>
+                            <p:childTnLst>
+                              <p:par>
+                                <p:cTn id="5" presetID="10" presetClass="entr" presetSubtype="0" fill="hold" grpId="0" nodeType="clickEffect">
+                                  <p:stCondLst>
+                                    <p:cond delay="0"/>
+                                  </p:stCondLst>
+                                  <p:childTnLst>
+                                    <p:set>
+                                      <p:cBhvr>
+                                        <p:cTn id="6" dur="1" fill="hold">
+                                          <p:stCondLst>
+                                            <p:cond delay="0"/>
+                                          </p:stCondLst>
+                                        </p:cTn>
+                                        <p:tgtEl>
+                                          <p:spTgt spid="3">
+                                            <p:txEl>
+                                              <p:pRg st="0" end="0"/>
+                                            </p:txEl>
+                                          </p:spTgt>
+                                        </p:tgtEl>
+                                        <p:attrNameLst>
+                                          <p:attrName>style.visibility</p:attrName>
+                                        </p:attrNameLst>
+                                      </p:cBhvr>
+                                      <p:to>
+                                        <p:strVal val="visible"/>
+                                      </p:to>
+                                    </p:set>
+                                    <p:animEffect transition="in" filter="fade">
+                                      <p:cBhvr>
+                                        <p:cTn id="7" dur="500"/>
+                                        <p:tgtEl>
+                                          <p:spTgt spid="3">
+                                            <p:txEl>
+                                              <p:pRg st="0" end="0"/>
+                                            </p:txEl>
+                                          </p:spTgt>
+                                        </p:tgtEl>
+                                      </p:cBhvr>
+                                    </p:animEffect>
+                                  </p:childTnLst>
+                                </p:cTn>
+                              </p:par>
+                              <p:par>
+                                <p:cTn id="8" presetID="10" presetClass="entr" presetSubtype="0" fill="hold" grpId="0" nodeType="withEffect">
+                                  <p:stCondLst>
+                                    <p:cond delay="0"/>
+                                  </p:stCondLst>
+                                  <p:childTnLst>
+                                    <p:set>
+                                      <p:cBhvr>
+                                        <p:cTn id="9" dur="1" fill="hold">
+                                          <p:stCondLst>
+                                            <p:cond delay="0"/>
+                                          </p:stCondLst>
+                                        </p:cTn>
+                                        <p:tgtEl>
+                                          <p:spTgt spid="3">
+                                            <p:txEl>
+                                              <p:pRg st="1" end="1"/>
+                                            </p:txEl>
+                                          </p:spTgt>
+                                        </p:tgtEl>
+                                        <p:attrNameLst>
+                                          <p:attrName>style.visibility</p:attrName>
+                                        </p:attrNameLst>
+                                      </p:cBhvr>
+                                      <p:to>
+                                        <p:strVal val="visible"/>
+                                      </p:to>
+                                    </p:set>
+                                    <p:animEffect transition="in" filter="fade">
+                                      <p:cBhvr>
+                                        <p:cTn id="10" dur="500"/>
+                                        <p:tgtEl>
+                                          <p:spTgt spid="3">
+                                            <p:txEl>
+                                              <p:pRg st="1" end="1"/>
+                                            </p:txEl>
+                                          </p:spTgt>
+                                        </p:tgtEl>
+                                      </p:cBhvr>
+                                    </p:animEffect>
+                                  </p:childTnLst>
+                                </p:cTn>
+                              </p:par>
+                              <p:par>
+                                <p:cTn id="11" presetID="10" presetClass="entr" presetSubtype="0" fill="hold" grpId="0" nodeType="withEffect">
+                                  <p:stCondLst>
+                                    <p:cond delay="0"/>
+                                  </p:stCondLst>
+                                  <p:childTnLst>
+                                    <p:set>
+                                      <p:cBhvr>
+                                        <p:cTn id="12" dur="1" fill="hold">
+                                          <p:stCondLst>
+                                            <p:cond delay="0"/>
+                                          </p:stCondLst>
+                                        </p:cTn>
+                                        <p:tgtEl>
+                                          <p:spTgt spid="3">
+                                            <p:txEl>
+                                              <p:pRg st="2" end="2"/>
+                                            </p:txEl>
+                                          </p:spTgt>
+                                        </p:tgtEl>
+                                        <p:attrNameLst>
+                                          <p:attrName>style.visibility</p:attrName>
+                                        </p:attrNameLst>
+                                      </p:cBhvr>
+                                      <p:to>
+                                        <p:strVal val="visible"/>
+                                      </p:to>
+                                    </p:set>
+                                    <p:animEffect transition="in" filter="fade">
+                                      <p:cBhvr>
+                                        <p:cTn id="13" dur="500"/>
+                                        <p:tgtEl>
+                                          <p:spTgt spid="3">
+                                            <p:txEl>
+                                              <p:pRg st="2" end="2"/>
+                                            </p:txEl>
+                                          </p:spTgt>
+                                        </p:tgtEl>
+                                      </p:cBhvr>
+                                    </p:animEffect>
+                                  </p:childTnLst>
+                                </p:cTn>
+                              </p:par>
+                            </p:childTnLst>
+                          </p:cTn>
+                        </p:par>
+                      </p:childTnLst>
+                    </p:cTn>
+                  </p:par>
+                  <p:par>
+                    <p:cTn id="14" fill="hold">
+                      <p:stCondLst>
+                        <p:cond delay="indefinite"/>
+                      </p:stCondLst>
+                      <p:childTnLst>
+                        <p:par>
+                          <p:cTn id="15" fill="hold">
+                            <p:stCondLst>
+                              <p:cond delay="0"/>
+                            </p:stCondLst>
+                            <p:childTnLst>
+                              <p:par>
+                                <p:cTn id="16" presetID="10" presetClass="entr" presetSubtype="0" fill="hold" grpId="0" nodeType="clickEffect">
+                                  <p:stCondLst>
+                                    <p:cond delay="0"/>
+                                  </p:stCondLst>
+                                  <p:childTnLst>
+                                    <p:set>
+                                      <p:cBhvr>
+                                        <p:cTn id="17" dur="1" fill="hold">
+                                          <p:stCondLst>
+                                            <p:cond delay="0"/>
+                                          </p:stCondLst>
+                                        </p:cTn>
+                                        <p:tgtEl>
+                                          <p:spTgt spid="3">
+                                            <p:txEl>
+                                              <p:pRg st="3" end="3"/>
+                                            </p:txEl>
+                                          </p:spTgt>
+                                        </p:tgtEl>
+                                        <p:attrNameLst>
+                                          <p:attrName>style.visibility</p:attrName>
+                                        </p:attrNameLst>
+                                      </p:cBhvr>
+                                      <p:to>
+                                        <p:strVal val="visible"/>
+                                      </p:to>
+                                    </p:set>
+                                    <p:animEffect transition="in" filter="fade">
+                                      <p:cBhvr>
+                                        <p:cTn id="18" dur="500"/>
+                                        <p:tgtEl>
+                                          <p:spTgt spid="3">
+                                            <p:txEl>
+                                              <p:pRg st="3" end="3"/>
+                                            </p:txEl>
+                                          </p:spTgt>
+                                        </p:tgtEl>
+                                      </p:cBhvr>
+                                    </p:animEffect>
+                                  </p:childTnLst>
+                                </p:cTn>
+                              </p:par>
+                              <p:par>
+                                <p:cTn id="19" presetID="10" presetClass="entr" presetSubtype="0" fill="hold" grpId="0" nodeType="withEffect">
+                                  <p:stCondLst>
+                                    <p:cond delay="0"/>
+                                  </p:stCondLst>
+                                  <p:childTnLst>
+                                    <p:set>
+                                      <p:cBhvr>
+                                        <p:cTn id="20" dur="1" fill="hold">
+                                          <p:stCondLst>
+                                            <p:cond delay="0"/>
+                                          </p:stCondLst>
+                                        </p:cTn>
+                                        <p:tgtEl>
+                                          <p:spTgt spid="3">
+                                            <p:txEl>
+                                              <p:pRg st="4" end="4"/>
+                                            </p:txEl>
+                                          </p:spTgt>
+                                        </p:tgtEl>
+                                        <p:attrNameLst>
+                                          <p:attrName>style.visibility</p:attrName>
+                                        </p:attrNameLst>
+                                      </p:cBhvr>
+                                      <p:to>
+                                        <p:strVal val="visible"/>
+                                      </p:to>
+                                    </p:set>
+                                    <p:animEffect transition="in" filter="fade">
+                                      <p:cBhvr>
+                                        <p:cTn id="21" dur="500"/>
+                                        <p:tgtEl>
+                                          <p:spTgt spid="3">
+                                            <p:txEl>
+                                              <p:pRg st="4" end="4"/>
+                                            </p:txEl>
+                                          </p:spTgt>
+                                        </p:tgtEl>
+                                      </p:cBhvr>
+                                    </p:animEffect>
+                                  </p:childTnLst>
+                                </p:cTn>
+                              </p:par>
+                              <p:par>
+                                <p:cTn id="22" presetID="10" presetClass="entr" presetSubtype="0" fill="hold" grpId="0" nodeType="withEffect">
+                                  <p:stCondLst>
+                                    <p:cond delay="0"/>
+                                  </p:stCondLst>
+                                  <p:childTnLst>
+                                    <p:set>
+                                      <p:cBhvr>
+                                        <p:cTn id="23" dur="1" fill="hold">
+                                          <p:stCondLst>
+                                            <p:cond delay="0"/>
+                                          </p:stCondLst>
+                                        </p:cTn>
+                                        <p:tgtEl>
+                                          <p:spTgt spid="3">
+                                            <p:txEl>
+                                              <p:pRg st="5" end="5"/>
+                                            </p:txEl>
+                                          </p:spTgt>
+                                        </p:tgtEl>
+                                        <p:attrNameLst>
+                                          <p:attrName>style.visibility</p:attrName>
+                                        </p:attrNameLst>
+                                      </p:cBhvr>
+                                      <p:to>
+                                        <p:strVal val="visible"/>
+                                      </p:to>
+                                    </p:set>
+                                    <p:animEffect transition="in" filter="fade">
+                                      <p:cBhvr>
+                                        <p:cTn id="24" dur="500"/>
+                                        <p:tgtEl>
+                                          <p:spTgt spid="3">
+                                            <p:txEl>
+                                              <p:pRg st="5" end="5"/>
+                                            </p:txEl>
+                                          </p:spTgt>
+                                        </p:tgtEl>
+                                      </p:cBhvr>
+                                    </p:animEffect>
+                                  </p:childTnLst>
+                                </p:cTn>
+                              </p:par>
+                            </p:childTnLst>
+                          </p:cTn>
+                        </p:par>
+                      </p:childTnLst>
+                    </p:cTn>
+                  </p:par>
+                  <p:par>
+                    <p:cTn id="25" fill="hold">
+                      <p:stCondLst>
+                        <p:cond delay="indefinite"/>
+                      </p:stCondLst>
+                      <p:childTnLst>
+                        <p:par>
+                          <p:cTn id="26" fill="hold">
+                            <p:stCondLst>
+                              <p:cond delay="0"/>
+                            </p:stCondLst>
+                            <p:childTnLst>
+                              <p:par>
+                                <p:cTn id="27" presetID="10" presetClass="entr" presetSubtype="0" fill="hold" grpId="0" nodeType="clickEffect">
+                                  <p:stCondLst>
+                                    <p:cond delay="0"/>
+                                  </p:stCondLst>
+                                  <p:childTnLst>
+                                    <p:set>
+                                      <p:cBhvr>
+                                        <p:cTn id="28" dur="1" fill="hold">
+                                          <p:stCondLst>
+                                            <p:cond delay="0"/>
+                                          </p:stCondLst>
+                                        </p:cTn>
+                                        <p:tgtEl>
+                                          <p:spTgt spid="3">
+                                            <p:txEl>
+                                              <p:pRg st="6" end="6"/>
+                                            </p:txEl>
+                                          </p:spTgt>
+                                        </p:tgtEl>
+                                        <p:attrNameLst>
+                                          <p:attrName>style.visibility</p:attrName>
+                                        </p:attrNameLst>
+                                      </p:cBhvr>
+                                      <p:to>
+                                        <p:strVal val="visible"/>
+                                      </p:to>
+                                    </p:set>
+                                    <p:animEffect transition="in" filter="fade">
+                                      <p:cBhvr>
+                                        <p:cTn id="29" dur="500"/>
+                                        <p:tgtEl>
+                                          <p:spTgt spid="3">
+                                            <p:txEl>
+                                              <p:pRg st="6" end="6"/>
+                                            </p:txEl>
+                                          </p:spTgt>
+                                        </p:tgtEl>
+                                      </p:cBhvr>
+                                    </p:animEffect>
+                                  </p:childTnLst>
+                                </p:cTn>
+                              </p:par>
+                              <p:par>
+                                <p:cTn id="30" presetID="10" presetClass="entr" presetSubtype="0" fill="hold" grpId="0" nodeType="withEffect">
+                                  <p:stCondLst>
+                                    <p:cond delay="0"/>
+                                  </p:stCondLst>
+                                  <p:childTnLst>
+                                    <p:set>
+                                      <p:cBhvr>
+                                        <p:cTn id="31" dur="1" fill="hold">
+                                          <p:stCondLst>
+                                            <p:cond delay="0"/>
+                                          </p:stCondLst>
+                                        </p:cTn>
+                                        <p:tgtEl>
+                                          <p:spTgt spid="3">
+                                            <p:txEl>
+                                              <p:pRg st="7" end="7"/>
+                                            </p:txEl>
+                                          </p:spTgt>
+                                        </p:tgtEl>
+                                        <p:attrNameLst>
+                                          <p:attrName>style.visibility</p:attrName>
+                                        </p:attrNameLst>
+                                      </p:cBhvr>
+                                      <p:to>
+                                        <p:strVal val="visible"/>
+                                      </p:to>
+                                    </p:set>
+                                    <p:animEffect transition="in" filter="fade">
+                                      <p:cBhvr>
+                                        <p:cTn id="32" dur="500"/>
+                                        <p:tgtEl>
+                                          <p:spTgt spid="3">
+                                            <p:txEl>
+                                              <p:pRg st="7" end="7"/>
+                                            </p:txEl>
+                                          </p:spTgt>
+                                        </p:tgtEl>
+                                      </p:cBhvr>
+                                    </p:animEffect>
+                                  </p:childTnLst>
+                                </p:cTn>
+                              </p:par>
+                            </p:childTnLst>
+                          </p:cTn>
+                        </p:par>
+                      </p:childTnLst>
+                    </p:cTn>
+                  </p:par>
+                </p:childTnLst>
+              </p:cTn>
+              <p:prevCondLst>
+                <p:cond evt="onPrev" delay="0">
+                  <p:tgtEl>
+                    <p:sldTgt/>
+                  </p:tgtEl>
+                </p:cond>
+              </p:prevCondLst>
+              <p:nextCondLst>
+                <p:cond evt="onNext" delay="0">
+                  <p:tgtEl>
+                    <p:sldTgt/>
+                  </p:tgtEl>
+                </p:cond>
+              </p:nextCondLst>
+            </p:seq>
+          </p:childTnLst>
+        </p:cTn>
+      </p:par>
+    </p:tnLst>
+    <p:bldLst>
+      <p:bldP spid="3" grpId="0" build="p"/>
+    </p:bldLst>
+  </p:timing>
+</p:sld>
+</file>
+
+<file path=ppt/slides/slide23.xml><?xml version="1.0" encoding="utf-8"?>
+<p:sld xmlns:a="http://schemas.openxmlformats.org/drawingml/2006/main" xmlns:r="http://schemas.openxmlformats.org/officeDocument/2006/relationships" xmlns:p="http://schemas.openxmlformats.org/presentationml/2006/main">
+  <p:cSld>
+    <p:spTree>
+      <p:nvGrpSpPr>
+        <p:cNvPr id="1" name=""/>
+        <p:cNvGrpSpPr/>
+        <p:nvPr/>
+      </p:nvGrpSpPr>
+      <p:grpSpPr>
+        <a:xfrm>
+          <a:off x="0" y="0"/>
+          <a:ext cx="0" cy="0"/>
+          <a:chOff x="0" y="0"/>
+          <a:chExt cx="0" cy="0"/>
+        </a:xfrm>
+      </p:grpSpPr>
+      <p:sp>
+        <p:nvSpPr>
+          <p:cNvPr id="2" name="Title 1">
+            <a:extLst>
+              <a:ext uri="{FF2B5EF4-FFF2-40B4-BE49-F238E27FC236}">
+                <a16:creationId xmlns:a16="http://schemas.microsoft.com/office/drawing/2014/main" id="{07AAEE6A-F45C-53E3-719E-F362797EB12A}"/>
+              </a:ext>
+            </a:extLst>
+          </p:cNvPr>
+          <p:cNvSpPr>
+            <a:spLocks noGrp="1"/>
+          </p:cNvSpPr>
+          <p:nvPr>
+            <p:ph type="title"/>
+          </p:nvPr>
+        </p:nvSpPr>
+        <p:spPr/>
+        <p:txBody>
+          <a:bodyPr/>
+          <a:lstStyle/>
+          <a:p>
+            <a:r>
+              <a:rPr lang="en-GB" dirty="0"/>
+              <a:t>What are confidence intervals?</a:t>
+            </a:r>
+          </a:p>
+        </p:txBody>
+      </p:sp>
+      <p:sp>
+        <p:nvSpPr>
+          <p:cNvPr id="3" name="Content Placeholder 2">
+            <a:extLst>
+              <a:ext uri="{FF2B5EF4-FFF2-40B4-BE49-F238E27FC236}">
+                <a16:creationId xmlns:a16="http://schemas.microsoft.com/office/drawing/2014/main" id="{473BA654-9E5C-B520-07C5-B4D372EE2424}"/>
+              </a:ext>
+            </a:extLst>
+          </p:cNvPr>
+          <p:cNvSpPr>
+            <a:spLocks noGrp="1"/>
+          </p:cNvSpPr>
+          <p:nvPr>
+            <p:ph idx="1"/>
+          </p:nvPr>
+        </p:nvSpPr>
+        <p:spPr/>
+        <p:txBody>
+          <a:bodyPr>
+            <a:normAutofit/>
+          </a:bodyPr>
+          <a:lstStyle/>
+          <a:p>
+            <a:r>
+              <a:rPr lang="en-GB" dirty="0"/>
+              <a:t>If we could rewind time and rerun the data collection and analysis multiple times, we’d be able to figure out the most likely range of the true value</a:t>
+            </a:r>
+          </a:p>
+          <a:p>
+            <a:r>
+              <a:rPr lang="en-GB" dirty="0"/>
+              <a:t>But if we only throw it once, we don’t know if the interval overlaps the true value</a:t>
+            </a:r>
+          </a:p>
+          <a:p>
+            <a:r>
+              <a:rPr lang="en-GB" dirty="0"/>
+              <a:t>Does the interval overlap the true parameter?</a:t>
+            </a:r>
+          </a:p>
+        </p:txBody>
+      </p:sp>
+      <p:pic>
+        <p:nvPicPr>
+          <p:cNvPr id="6" name="Picture Placeholder 5" descr="A hand holding a ring&#10;&#10;Description automatically generated">
+            <a:extLst>
+              <a:ext uri="{FF2B5EF4-FFF2-40B4-BE49-F238E27FC236}">
+                <a16:creationId xmlns:a16="http://schemas.microsoft.com/office/drawing/2014/main" id="{80D7A350-8BF0-B43E-4A83-32CA4C9827AC}"/>
+              </a:ext>
+            </a:extLst>
+          </p:cNvPr>
+          <p:cNvPicPr>
+            <a:picLocks noGrp="1" noChangeAspect="1"/>
+          </p:cNvPicPr>
+          <p:nvPr>
+            <p:ph type="pic" sz="quarter" idx="10"/>
+          </p:nvPr>
+        </p:nvPicPr>
+        <p:blipFill rotWithShape="1">
+          <a:blip r:embed="rId2">
+            <a:extLst>
+              <a:ext uri="{28A0092B-C50C-407E-A947-70E740481C1C}">
+                <a14:useLocalDpi xmlns:a14="http://schemas.microsoft.com/office/drawing/2010/main" val="0"/>
+              </a:ext>
+            </a:extLst>
+          </a:blip>
+          <a:srcRect l="-257" t="-32794" r="-404" b="-24858"/>
+          <a:stretch/>
+        </p:blipFill>
+        <p:spPr>
+          <a:xfrm>
+            <a:off x="6359525" y="0"/>
+            <a:ext cx="5832475" cy="6858000"/>
+          </a:xfrm>
+        </p:spPr>
+      </p:pic>
+      <p:pic>
+        <p:nvPicPr>
+          <p:cNvPr id="5" name="Picture 4" descr="A graph with a point on it&#10;&#10;Description automatically generated">
+            <a:extLst>
+              <a:ext uri="{FF2B5EF4-FFF2-40B4-BE49-F238E27FC236}">
+                <a16:creationId xmlns:a16="http://schemas.microsoft.com/office/drawing/2014/main" id="{9A7E3BFD-BFA8-4E99-E3C1-894DA9502563}"/>
+              </a:ext>
+            </a:extLst>
+          </p:cNvPr>
+          <p:cNvPicPr>
+            <a:picLocks noChangeAspect="1"/>
+          </p:cNvPicPr>
+          <p:nvPr/>
+        </p:nvPicPr>
+        <p:blipFill>
+          <a:blip r:embed="rId3">
+            <a:extLst>
+              <a:ext uri="{28A0092B-C50C-407E-A947-70E740481C1C}">
+                <a14:useLocalDpi xmlns:a14="http://schemas.microsoft.com/office/drawing/2010/main" val="0"/>
+              </a:ext>
+            </a:extLst>
+          </a:blip>
+          <a:stretch>
+            <a:fillRect/>
+          </a:stretch>
+        </p:blipFill>
+        <p:spPr>
+          <a:xfrm>
+            <a:off x="6307225" y="662780"/>
+            <a:ext cx="5884775" cy="5884775"/>
+          </a:xfrm>
+          <a:prstGeom prst="rect">
+            <a:avLst/>
+          </a:prstGeom>
+        </p:spPr>
+      </p:pic>
+      <p:pic>
+        <p:nvPicPr>
+          <p:cNvPr id="8" name="Picture 7" descr="A screen shot of a graph&#10;&#10;Description automatically generated">
+            <a:extLst>
+              <a:ext uri="{FF2B5EF4-FFF2-40B4-BE49-F238E27FC236}">
+                <a16:creationId xmlns:a16="http://schemas.microsoft.com/office/drawing/2014/main" id="{0E203741-DA5F-8841-7987-8801CE798C8A}"/>
+              </a:ext>
+            </a:extLst>
+          </p:cNvPr>
+          <p:cNvPicPr>
+            <a:picLocks noChangeAspect="1"/>
+          </p:cNvPicPr>
+          <p:nvPr/>
+        </p:nvPicPr>
+        <p:blipFill>
+          <a:blip r:embed="rId4">
+            <a:extLst>
+              <a:ext uri="{28A0092B-C50C-407E-A947-70E740481C1C}">
+                <a14:useLocalDpi xmlns:a14="http://schemas.microsoft.com/office/drawing/2010/main" val="0"/>
+              </a:ext>
+            </a:extLst>
+          </a:blip>
+          <a:stretch>
+            <a:fillRect/>
+          </a:stretch>
+        </p:blipFill>
+        <p:spPr>
+          <a:xfrm>
+            <a:off x="6399826" y="0"/>
+            <a:ext cx="5751871" cy="6858000"/>
+          </a:xfrm>
+          <a:prstGeom prst="rect">
+            <a:avLst/>
+          </a:prstGeom>
+        </p:spPr>
+      </p:pic>
+    </p:spTree>
+    <p:extLst>
+      <p:ext uri="{BB962C8B-B14F-4D97-AF65-F5344CB8AC3E}">
+        <p14:creationId xmlns:p14="http://schemas.microsoft.com/office/powerpoint/2010/main" val="3232504566"/>
+      </p:ext>
+    </p:extLst>
+  </p:cSld>
+  <p:clrMapOvr>
+    <a:masterClrMapping/>
+  </p:clrMapOvr>
+  <p:timing>
+    <p:tnLst>
+      <p:par>
+        <p:cTn id="1" dur="indefinite" restart="never" nodeType="tmRoot">
+          <p:childTnLst>
+            <p:seq concurrent="1" nextAc="seek">
+              <p:cTn id="2" dur="indefinite" nodeType="mainSeq">
+                <p:childTnLst>
+                  <p:par>
+                    <p:cTn id="3" fill="hold">
+                      <p:stCondLst>
+                        <p:cond delay="indefinite"/>
+                      </p:stCondLst>
+                      <p:childTnLst>
+                        <p:par>
+                          <p:cTn id="4" fill="hold">
+                            <p:stCondLst>
+                              <p:cond delay="0"/>
+                            </p:stCondLst>
+                            <p:childTnLst>
+                              <p:par>
+                                <p:cTn id="5" presetID="10" presetClass="entr" presetSubtype="0" fill="hold" grpId="0" nodeType="clickEffect">
+                                  <p:stCondLst>
+                                    <p:cond delay="0"/>
+                                  </p:stCondLst>
+                                  <p:childTnLst>
+                                    <p:set>
+                                      <p:cBhvr>
+                                        <p:cTn id="6" dur="1" fill="hold">
+                                          <p:stCondLst>
+                                            <p:cond delay="0"/>
+                                          </p:stCondLst>
+                                        </p:cTn>
+                                        <p:tgtEl>
+                                          <p:spTgt spid="3">
+                                            <p:txEl>
+                                              <p:pRg st="0" end="0"/>
+                                            </p:txEl>
+                                          </p:spTgt>
+                                        </p:tgtEl>
+                                        <p:attrNameLst>
+                                          <p:attrName>style.visibility</p:attrName>
+                                        </p:attrNameLst>
+                                      </p:cBhvr>
+                                      <p:to>
+                                        <p:strVal val="visible"/>
+                                      </p:to>
+                                    </p:set>
+                                    <p:animEffect transition="in" filter="fade">
+                                      <p:cBhvr>
+                                        <p:cTn id="7" dur="500"/>
+                                        <p:tgtEl>
+                                          <p:spTgt spid="3">
+                                            <p:txEl>
+                                              <p:pRg st="0" end="0"/>
+                                            </p:txEl>
+                                          </p:spTgt>
+                                        </p:tgtEl>
+                                      </p:cBhvr>
+                                    </p:animEffect>
+                                  </p:childTnLst>
+                                </p:cTn>
+                              </p:par>
+                            </p:childTnLst>
+                          </p:cTn>
+                        </p:par>
+                      </p:childTnLst>
+                    </p:cTn>
+                  </p:par>
+                  <p:par>
+                    <p:cTn id="8" fill="hold">
+                      <p:stCondLst>
+                        <p:cond delay="indefinite"/>
+                      </p:stCondLst>
+                      <p:childTnLst>
+                        <p:par>
+                          <p:cTn id="9" fill="hold">
+                            <p:stCondLst>
+                              <p:cond delay="0"/>
+                            </p:stCondLst>
+                            <p:childTnLst>
+                              <p:par>
+                                <p:cTn id="10" presetID="1" presetClass="entr" presetSubtype="0" fill="hold" nodeType="clickEffect">
+                                  <p:stCondLst>
+                                    <p:cond delay="0"/>
+                                  </p:stCondLst>
+                                  <p:childTnLst>
+                                    <p:set>
+                                      <p:cBhvr>
+                                        <p:cTn id="11" dur="1" fill="hold">
+                                          <p:stCondLst>
+                                            <p:cond delay="0"/>
+                                          </p:stCondLst>
+                                        </p:cTn>
+                                        <p:tgtEl>
+                                          <p:spTgt spid="5"/>
+                                        </p:tgtEl>
+                                        <p:attrNameLst>
+                                          <p:attrName>style.visibility</p:attrName>
+                                        </p:attrNameLst>
+                                      </p:cBhvr>
+                                      <p:to>
+                                        <p:strVal val="visible"/>
+                                      </p:to>
+                                    </p:set>
+                                  </p:childTnLst>
+                                </p:cTn>
+                              </p:par>
+                            </p:childTnLst>
+                          </p:cTn>
+                        </p:par>
+                      </p:childTnLst>
+                    </p:cTn>
+                  </p:par>
+                  <p:par>
+                    <p:cTn id="12" fill="hold">
+                      <p:stCondLst>
+                        <p:cond delay="indefinite"/>
+                      </p:stCondLst>
+                      <p:childTnLst>
+                        <p:par>
+                          <p:cTn id="13" fill="hold">
+                            <p:stCondLst>
+                              <p:cond delay="0"/>
+                            </p:stCondLst>
+                            <p:childTnLst>
+                              <p:par>
+                                <p:cTn id="14" presetID="10" presetClass="entr" presetSubtype="0" fill="hold" grpId="0" nodeType="clickEffect">
+                                  <p:stCondLst>
+                                    <p:cond delay="0"/>
+                                  </p:stCondLst>
+                                  <p:childTnLst>
+                                    <p:set>
+                                      <p:cBhvr>
+                                        <p:cTn id="15" dur="1" fill="hold">
+                                          <p:stCondLst>
+                                            <p:cond delay="0"/>
+                                          </p:stCondLst>
+                                        </p:cTn>
+                                        <p:tgtEl>
+                                          <p:spTgt spid="3">
+                                            <p:txEl>
+                                              <p:pRg st="1" end="1"/>
+                                            </p:txEl>
+                                          </p:spTgt>
+                                        </p:tgtEl>
+                                        <p:attrNameLst>
+                                          <p:attrName>style.visibility</p:attrName>
+                                        </p:attrNameLst>
+                                      </p:cBhvr>
+                                      <p:to>
+                                        <p:strVal val="visible"/>
+                                      </p:to>
+                                    </p:set>
+                                    <p:animEffect transition="in" filter="fade">
+                                      <p:cBhvr>
+                                        <p:cTn id="16" dur="500"/>
+                                        <p:tgtEl>
+                                          <p:spTgt spid="3">
+                                            <p:txEl>
+                                              <p:pRg st="1" end="1"/>
+                                            </p:txEl>
+                                          </p:spTgt>
+                                        </p:tgtEl>
+                                      </p:cBhvr>
+                                    </p:animEffect>
+                                  </p:childTnLst>
+                                </p:cTn>
+                              </p:par>
+                            </p:childTnLst>
+                          </p:cTn>
+                        </p:par>
+                      </p:childTnLst>
+                    </p:cTn>
+                  </p:par>
+                  <p:par>
+                    <p:cTn id="17" fill="hold">
+                      <p:stCondLst>
+                        <p:cond delay="indefinite"/>
+                      </p:stCondLst>
+                      <p:childTnLst>
+                        <p:par>
+                          <p:cTn id="18" fill="hold">
+                            <p:stCondLst>
+                              <p:cond delay="0"/>
+                            </p:stCondLst>
+                            <p:childTnLst>
+                              <p:par>
+                                <p:cTn id="19" presetID="10" presetClass="entr" presetSubtype="0" fill="hold" nodeType="clickEffect">
+                                  <p:stCondLst>
+                                    <p:cond delay="0"/>
+                                  </p:stCondLst>
+                                  <p:childTnLst>
+                                    <p:set>
+                                      <p:cBhvr>
+                                        <p:cTn id="20" dur="1" fill="hold">
+                                          <p:stCondLst>
+                                            <p:cond delay="0"/>
+                                          </p:stCondLst>
+                                        </p:cTn>
+                                        <p:tgtEl>
+                                          <p:spTgt spid="8"/>
+                                        </p:tgtEl>
+                                        <p:attrNameLst>
+                                          <p:attrName>style.visibility</p:attrName>
+                                        </p:attrNameLst>
+                                      </p:cBhvr>
+                                      <p:to>
+                                        <p:strVal val="visible"/>
+                                      </p:to>
+                                    </p:set>
+                                    <p:animEffect transition="in" filter="fade">
+                                      <p:cBhvr>
+                                        <p:cTn id="21" dur="500"/>
+                                        <p:tgtEl>
+                                          <p:spTgt spid="8"/>
+                                        </p:tgtEl>
+                                      </p:cBhvr>
+                                    </p:animEffect>
+                                  </p:childTnLst>
+                                </p:cTn>
+                              </p:par>
+                              <p:par>
+                                <p:cTn id="22" presetID="10" presetClass="entr" presetSubtype="0" fill="hold" grpId="0" nodeType="withEffect">
+                                  <p:stCondLst>
+                                    <p:cond delay="0"/>
+                                  </p:stCondLst>
+                                  <p:childTnLst>
+                                    <p:set>
+                                      <p:cBhvr>
+                                        <p:cTn id="23" dur="1" fill="hold">
+                                          <p:stCondLst>
+                                            <p:cond delay="0"/>
+                                          </p:stCondLst>
+                                        </p:cTn>
+                                        <p:tgtEl>
+                                          <p:spTgt spid="3">
+                                            <p:txEl>
+                                              <p:pRg st="2" end="2"/>
+                                            </p:txEl>
+                                          </p:spTgt>
+                                        </p:tgtEl>
+                                        <p:attrNameLst>
+                                          <p:attrName>style.visibility</p:attrName>
+                                        </p:attrNameLst>
+                                      </p:cBhvr>
+                                      <p:to>
+                                        <p:strVal val="visible"/>
+                                      </p:to>
+                                    </p:set>
+                                    <p:animEffect transition="in" filter="fade">
+                                      <p:cBhvr>
+                                        <p:cTn id="24" dur="500"/>
+                                        <p:tgtEl>
+                                          <p:spTgt spid="3">
+                                            <p:txEl>
+                                              <p:pRg st="2" end="2"/>
+                                            </p:txEl>
+                                          </p:spTgt>
+                                        </p:tgtEl>
+                                      </p:cBhvr>
+                                    </p:animEffect>
+                                  </p:childTnLst>
+                                </p:cTn>
+                              </p:par>
+                            </p:childTnLst>
+                          </p:cTn>
+                        </p:par>
+                      </p:childTnLst>
+                    </p:cTn>
+                  </p:par>
+                </p:childTnLst>
+              </p:cTn>
+              <p:prevCondLst>
+                <p:cond evt="onPrev" delay="0">
+                  <p:tgtEl>
+                    <p:sldTgt/>
+                  </p:tgtEl>
+                </p:cond>
+              </p:prevCondLst>
+              <p:nextCondLst>
+                <p:cond evt="onNext" delay="0">
+                  <p:tgtEl>
+                    <p:sldTgt/>
+                  </p:tgtEl>
+                </p:cond>
+              </p:nextCondLst>
+            </p:seq>
+          </p:childTnLst>
+        </p:cTn>
+      </p:par>
+    </p:tnLst>
+    <p:bldLst>
+      <p:bldP spid="3" grpId="0" uiExpand="1" build="p"/>
+    </p:bldLst>
+  </p:timing>
+</p:sld>
+</file>
+
+<file path=ppt/slides/slide24.xml><?xml version="1.0" encoding="utf-8"?>
+<p:sld xmlns:a="http://schemas.openxmlformats.org/drawingml/2006/main" xmlns:r="http://schemas.openxmlformats.org/officeDocument/2006/relationships" xmlns:p="http://schemas.openxmlformats.org/presentationml/2006/main">
+  <p:cSld>
+    <p:spTree>
+      <p:nvGrpSpPr>
+        <p:cNvPr id="1" name=""/>
+        <p:cNvGrpSpPr/>
+        <p:nvPr/>
+      </p:nvGrpSpPr>
+      <p:grpSpPr>
+        <a:xfrm>
+          <a:off x="0" y="0"/>
+          <a:ext cx="0" cy="0"/>
+          <a:chOff x="0" y="0"/>
+          <a:chExt cx="0" cy="0"/>
+        </a:xfrm>
+      </p:grpSpPr>
+      <p:sp>
+        <p:nvSpPr>
+          <p:cNvPr id="2" name="Title 1">
+            <a:extLst>
+              <a:ext uri="{FF2B5EF4-FFF2-40B4-BE49-F238E27FC236}">
+                <a16:creationId xmlns:a16="http://schemas.microsoft.com/office/drawing/2014/main" id="{07AAEE6A-F45C-53E3-719E-F362797EB12A}"/>
+              </a:ext>
+            </a:extLst>
+          </p:cNvPr>
+          <p:cNvSpPr>
+            <a:spLocks noGrp="1"/>
+          </p:cNvSpPr>
+          <p:nvPr>
+            <p:ph type="title"/>
+          </p:nvPr>
+        </p:nvSpPr>
+        <p:spPr/>
+        <p:txBody>
+          <a:bodyPr/>
+          <a:lstStyle/>
+          <a:p>
+            <a:r>
+              <a:rPr lang="en-GB" dirty="0"/>
+              <a:t>What are confidence intervals?</a:t>
+            </a:r>
+          </a:p>
+        </p:txBody>
+      </p:sp>
+      <p:sp>
+        <p:nvSpPr>
+          <p:cNvPr id="3" name="Content Placeholder 2">
+            <a:extLst>
+              <a:ext uri="{FF2B5EF4-FFF2-40B4-BE49-F238E27FC236}">
+                <a16:creationId xmlns:a16="http://schemas.microsoft.com/office/drawing/2014/main" id="{473BA654-9E5C-B520-07C5-B4D372EE2424}"/>
+              </a:ext>
+            </a:extLst>
+          </p:cNvPr>
+          <p:cNvSpPr>
+            <a:spLocks noGrp="1"/>
+          </p:cNvSpPr>
+          <p:nvPr>
+            <p:ph idx="1"/>
+          </p:nvPr>
+        </p:nvSpPr>
+        <p:spPr/>
+        <p:txBody>
+          <a:bodyPr>
+            <a:normAutofit/>
+          </a:bodyPr>
+          <a:lstStyle/>
+          <a:p>
+            <a:r>
+              <a:rPr lang="en-GB" dirty="0"/>
+              <a:t>A 95% Confidence Interval does not have a 95% chance of containing the true parameter value</a:t>
+            </a:r>
+          </a:p>
+          <a:p>
+            <a:r>
+              <a:rPr lang="en-GB" dirty="0"/>
+              <a:t>It either does, or it doesn’t</a:t>
+            </a:r>
+          </a:p>
+          <a:p>
+            <a:pPr lvl="1"/>
+            <a:r>
+              <a:rPr lang="en-GB" dirty="0"/>
+              <a:t>Just like the ring is either over the post or not</a:t>
+            </a:r>
+          </a:p>
+          <a:p>
+            <a:r>
+              <a:rPr lang="en-GB" dirty="0"/>
+              <a:t>But, for convenience, we can think of a 95% CI as having a 95% chance of overlapping the true value</a:t>
+            </a:r>
+          </a:p>
+          <a:p>
+            <a:pPr lvl="1"/>
+            <a:r>
+              <a:rPr lang="en-GB" dirty="0"/>
+              <a:t>It’s not technically correct, so don’t say that to any statisticians</a:t>
+            </a:r>
+          </a:p>
+        </p:txBody>
+      </p:sp>
+      <p:pic>
+        <p:nvPicPr>
+          <p:cNvPr id="9" name="Picture Placeholder 8" descr="A graph with a point on it&#10;&#10;Description automatically generated">
+            <a:extLst>
+              <a:ext uri="{FF2B5EF4-FFF2-40B4-BE49-F238E27FC236}">
+                <a16:creationId xmlns:a16="http://schemas.microsoft.com/office/drawing/2014/main" id="{9A7E3BFD-BFA8-4E99-E3C1-894DA9502563}"/>
+              </a:ext>
+            </a:extLst>
+          </p:cNvPr>
+          <p:cNvPicPr>
+            <a:picLocks noGrp="1" noChangeAspect="1"/>
+          </p:cNvPicPr>
+          <p:nvPr>
+            <p:ph type="pic" sz="quarter" idx="10"/>
+          </p:nvPr>
+        </p:nvPicPr>
+        <p:blipFill rotWithShape="1">
+          <a:blip r:embed="rId2">
+            <a:extLst>
+              <a:ext uri="{28A0092B-C50C-407E-A947-70E740481C1C}">
+                <a14:useLocalDpi xmlns:a14="http://schemas.microsoft.com/office/drawing/2010/main" val="0"/>
+              </a:ext>
+            </a:extLst>
+          </a:blip>
+          <a:srcRect l="-337" t="-9128" r="357" b="-8432"/>
+          <a:stretch/>
+        </p:blipFill>
+        <p:spPr>
+          <a:xfrm>
+            <a:off x="6359525" y="0"/>
+            <a:ext cx="5832475" cy="6858000"/>
+          </a:xfrm>
+          <a:prstGeom prst="rect">
+            <a:avLst/>
+          </a:prstGeom>
+        </p:spPr>
+      </p:pic>
+    </p:spTree>
+    <p:extLst>
+      <p:ext uri="{BB962C8B-B14F-4D97-AF65-F5344CB8AC3E}">
+        <p14:creationId xmlns:p14="http://schemas.microsoft.com/office/powerpoint/2010/main" val="2940744693"/>
+      </p:ext>
+    </p:extLst>
+  </p:cSld>
+  <p:clrMapOvr>
+    <a:masterClrMapping/>
+  </p:clrMapOvr>
+  <p:timing>
+    <p:tnLst>
+      <p:par>
+        <p:cTn id="1" dur="indefinite" restart="never" nodeType="tmRoot">
+          <p:childTnLst>
+            <p:seq concurrent="1" nextAc="seek">
+              <p:cTn id="2" dur="indefinite" nodeType="mainSeq">
+                <p:childTnLst>
+                  <p:par>
+                    <p:cTn id="3" fill="hold">
+                      <p:stCondLst>
+                        <p:cond delay="indefinite"/>
+                      </p:stCondLst>
+                      <p:childTnLst>
+                        <p:par>
+                          <p:cTn id="4" fill="hold">
+                            <p:stCondLst>
+                              <p:cond delay="0"/>
+                            </p:stCondLst>
+                            <p:childTnLst>
+                              <p:par>
+                                <p:cTn id="5" presetID="10" presetClass="entr" presetSubtype="0" fill="hold" grpId="0" nodeType="clickEffect">
+                                  <p:stCondLst>
+                                    <p:cond delay="0"/>
+                                  </p:stCondLst>
+                                  <p:childTnLst>
+                                    <p:set>
+                                      <p:cBhvr>
+                                        <p:cTn id="6" dur="1" fill="hold">
+                                          <p:stCondLst>
+                                            <p:cond delay="0"/>
+                                          </p:stCondLst>
+                                        </p:cTn>
+                                        <p:tgtEl>
+                                          <p:spTgt spid="3">
+                                            <p:txEl>
+                                              <p:pRg st="0" end="0"/>
+                                            </p:txEl>
+                                          </p:spTgt>
+                                        </p:tgtEl>
+                                        <p:attrNameLst>
+                                          <p:attrName>style.visibility</p:attrName>
+                                        </p:attrNameLst>
+                                      </p:cBhvr>
+                                      <p:to>
+                                        <p:strVal val="visible"/>
+                                      </p:to>
+                                    </p:set>
+                                    <p:animEffect transition="in" filter="fade">
+                                      <p:cBhvr>
+                                        <p:cTn id="7" dur="500"/>
+                                        <p:tgtEl>
+                                          <p:spTgt spid="3">
+                                            <p:txEl>
+                                              <p:pRg st="0" end="0"/>
+                                            </p:txEl>
+                                          </p:spTgt>
+                                        </p:tgtEl>
+                                      </p:cBhvr>
+                                    </p:animEffect>
+                                  </p:childTnLst>
+                                </p:cTn>
+                              </p:par>
+                            </p:childTnLst>
+                          </p:cTn>
+                        </p:par>
+                      </p:childTnLst>
+                    </p:cTn>
+                  </p:par>
+                  <p:par>
+                    <p:cTn id="8" fill="hold">
+                      <p:stCondLst>
+                        <p:cond delay="indefinite"/>
+                      </p:stCondLst>
+                      <p:childTnLst>
+                        <p:par>
+                          <p:cTn id="9" fill="hold">
+                            <p:stCondLst>
+                              <p:cond delay="0"/>
+                            </p:stCondLst>
+                            <p:childTnLst>
+                              <p:par>
+                                <p:cTn id="10" presetID="10" presetClass="entr" presetSubtype="0" fill="hold" grpId="0" nodeType="clickEffect">
+                                  <p:stCondLst>
+                                    <p:cond delay="0"/>
+                                  </p:stCondLst>
+                                  <p:childTnLst>
+                                    <p:set>
+                                      <p:cBhvr>
+                                        <p:cTn id="11" dur="1" fill="hold">
+                                          <p:stCondLst>
+                                            <p:cond delay="0"/>
+                                          </p:stCondLst>
+                                        </p:cTn>
+                                        <p:tgtEl>
+                                          <p:spTgt spid="3">
+                                            <p:txEl>
+                                              <p:pRg st="1" end="1"/>
+                                            </p:txEl>
+                                          </p:spTgt>
+                                        </p:tgtEl>
+                                        <p:attrNameLst>
+                                          <p:attrName>style.visibility</p:attrName>
+                                        </p:attrNameLst>
+                                      </p:cBhvr>
+                                      <p:to>
+                                        <p:strVal val="visible"/>
+                                      </p:to>
+                                    </p:set>
+                                    <p:animEffect transition="in" filter="fade">
+                                      <p:cBhvr>
+                                        <p:cTn id="12" dur="500"/>
+                                        <p:tgtEl>
+                                          <p:spTgt spid="3">
+                                            <p:txEl>
+                                              <p:pRg st="1" end="1"/>
+                                            </p:txEl>
+                                          </p:spTgt>
+                                        </p:tgtEl>
+                                      </p:cBhvr>
+                                    </p:animEffect>
+                                  </p:childTnLst>
+                                </p:cTn>
+                              </p:par>
+                              <p:par>
+                                <p:cTn id="13" presetID="10" presetClass="entr" presetSubtype="0" fill="hold" grpId="0" nodeType="withEffect">
+                                  <p:stCondLst>
+                                    <p:cond delay="0"/>
+                                  </p:stCondLst>
+                                  <p:childTnLst>
+                                    <p:set>
+                                      <p:cBhvr>
+                                        <p:cTn id="14" dur="1" fill="hold">
+                                          <p:stCondLst>
+                                            <p:cond delay="0"/>
+                                          </p:stCondLst>
+                                        </p:cTn>
+                                        <p:tgtEl>
+                                          <p:spTgt spid="3">
+                                            <p:txEl>
+                                              <p:pRg st="2" end="2"/>
+                                            </p:txEl>
+                                          </p:spTgt>
+                                        </p:tgtEl>
+                                        <p:attrNameLst>
+                                          <p:attrName>style.visibility</p:attrName>
+                                        </p:attrNameLst>
+                                      </p:cBhvr>
+                                      <p:to>
+                                        <p:strVal val="visible"/>
+                                      </p:to>
+                                    </p:set>
+                                    <p:animEffect transition="in" filter="fade">
+                                      <p:cBhvr>
+                                        <p:cTn id="15" dur="500"/>
+                                        <p:tgtEl>
+                                          <p:spTgt spid="3">
+                                            <p:txEl>
+                                              <p:pRg st="2" end="2"/>
+                                            </p:txEl>
+                                          </p:spTgt>
+                                        </p:tgtEl>
+                                      </p:cBhvr>
+                                    </p:animEffect>
+                                  </p:childTnLst>
+                                </p:cTn>
+                              </p:par>
+                            </p:childTnLst>
+                          </p:cTn>
+                        </p:par>
+                      </p:childTnLst>
+                    </p:cTn>
+                  </p:par>
+                  <p:par>
+                    <p:cTn id="16" fill="hold">
+                      <p:stCondLst>
+                        <p:cond delay="indefinite"/>
+                      </p:stCondLst>
+                      <p:childTnLst>
+                        <p:par>
+                          <p:cTn id="17" fill="hold">
+                            <p:stCondLst>
+                              <p:cond delay="0"/>
+                            </p:stCondLst>
+                            <p:childTnLst>
+                              <p:par>
+                                <p:cTn id="18" presetID="10" presetClass="entr" presetSubtype="0" fill="hold" grpId="0" nodeType="clickEffect">
+                                  <p:stCondLst>
+                                    <p:cond delay="0"/>
+                                  </p:stCondLst>
+                                  <p:childTnLst>
+                                    <p:set>
+                                      <p:cBhvr>
+                                        <p:cTn id="19" dur="1" fill="hold">
+                                          <p:stCondLst>
+                                            <p:cond delay="0"/>
+                                          </p:stCondLst>
+                                        </p:cTn>
+                                        <p:tgtEl>
+                                          <p:spTgt spid="3">
+                                            <p:txEl>
+                                              <p:pRg st="3" end="3"/>
+                                            </p:txEl>
+                                          </p:spTgt>
+                                        </p:tgtEl>
+                                        <p:attrNameLst>
+                                          <p:attrName>style.visibility</p:attrName>
+                                        </p:attrNameLst>
+                                      </p:cBhvr>
+                                      <p:to>
+                                        <p:strVal val="visible"/>
+                                      </p:to>
+                                    </p:set>
+                                    <p:animEffect transition="in" filter="fade">
+                                      <p:cBhvr>
+                                        <p:cTn id="20" dur="500"/>
+                                        <p:tgtEl>
+                                          <p:spTgt spid="3">
+                                            <p:txEl>
+                                              <p:pRg st="3" end="3"/>
+                                            </p:txEl>
+                                          </p:spTgt>
+                                        </p:tgtEl>
+                                      </p:cBhvr>
+                                    </p:animEffect>
+                                  </p:childTnLst>
+                                </p:cTn>
+                              </p:par>
+                              <p:par>
+                                <p:cTn id="21" presetID="10" presetClass="entr" presetSubtype="0" fill="hold" grpId="0" nodeType="withEffect">
+                                  <p:stCondLst>
+                                    <p:cond delay="0"/>
+                                  </p:stCondLst>
+                                  <p:childTnLst>
+                                    <p:set>
+                                      <p:cBhvr>
+                                        <p:cTn id="22" dur="1" fill="hold">
+                                          <p:stCondLst>
+                                            <p:cond delay="0"/>
+                                          </p:stCondLst>
+                                        </p:cTn>
+                                        <p:tgtEl>
+                                          <p:spTgt spid="3">
+                                            <p:txEl>
+                                              <p:pRg st="4" end="4"/>
+                                            </p:txEl>
+                                          </p:spTgt>
+                                        </p:tgtEl>
+                                        <p:attrNameLst>
+                                          <p:attrName>style.visibility</p:attrName>
+                                        </p:attrNameLst>
+                                      </p:cBhvr>
+                                      <p:to>
+                                        <p:strVal val="visible"/>
+                                      </p:to>
+                                    </p:set>
+                                    <p:animEffect transition="in" filter="fade">
+                                      <p:cBhvr>
+                                        <p:cTn id="23" dur="500"/>
+                                        <p:tgtEl>
+                                          <p:spTgt spid="3">
+                                            <p:txEl>
+                                              <p:pRg st="4" end="4"/>
+                                            </p:txEl>
+                                          </p:spTgt>
+                                        </p:tgtEl>
+                                      </p:cBhvr>
+                                    </p:animEffect>
+                                  </p:childTnLst>
+                                </p:cTn>
+                              </p:par>
+                            </p:childTnLst>
+                          </p:cTn>
+                        </p:par>
+                      </p:childTnLst>
+                    </p:cTn>
+                  </p:par>
+                  <p:par>
+                    <p:cTn id="24" fill="hold">
+                      <p:stCondLst>
+                        <p:cond delay="indefinite"/>
+                      </p:stCondLst>
+                      <p:childTnLst>
+                        <p:par>
+                          <p:cTn id="25" fill="hold">
+                            <p:stCondLst>
+                              <p:cond delay="0"/>
+                            </p:stCondLst>
+                            <p:childTnLst>
+                              <p:par>
+                                <p:cTn id="26" presetID="1" presetClass="entr" presetSubtype="0" fill="hold" nodeType="clickEffect">
+                                  <p:stCondLst>
+                                    <p:cond delay="0"/>
+                                  </p:stCondLst>
+                                  <p:childTnLst>
+                                    <p:set>
+                                      <p:cBhvr>
+                                        <p:cTn id="27" dur="1" fill="hold">
+                                          <p:stCondLst>
+                                            <p:cond delay="0"/>
+                                          </p:stCondLst>
+                                        </p:cTn>
+                                        <p:tgtEl>
+                                          <p:spTgt spid="9"/>
+                                        </p:tgtEl>
+                                        <p:attrNameLst>
+                                          <p:attrName>style.visibility</p:attrName>
+                                        </p:attrNameLst>
+                                      </p:cBhvr>
+                                      <p:to>
+                                        <p:strVal val="visible"/>
+                                      </p:to>
+                                    </p:set>
+                                  </p:childTnLst>
+                                </p:cTn>
+                              </p:par>
+                            </p:childTnLst>
+                          </p:cTn>
+                        </p:par>
+                      </p:childTnLst>
+                    </p:cTn>
+                  </p:par>
+                </p:childTnLst>
+              </p:cTn>
+              <p:prevCondLst>
+                <p:cond evt="onPrev" delay="0">
+                  <p:tgtEl>
+                    <p:sldTgt/>
+                  </p:tgtEl>
+                </p:cond>
+              </p:prevCondLst>
+              <p:nextCondLst>
+                <p:cond evt="onNext" delay="0">
+                  <p:tgtEl>
+                    <p:sldTgt/>
+                  </p:tgtEl>
+                </p:cond>
+              </p:nextCondLst>
+            </p:seq>
+          </p:childTnLst>
+        </p:cTn>
+      </p:par>
+    </p:tnLst>
+    <p:bldLst>
+      <p:bldP spid="3" grpId="0" uiExpand="1" build="p"/>
+    </p:bldLst>
+  </p:timing>
+</p:sld>
+</file>
+
+<file path=ppt/slides/slide25.xml><?xml version="1.0" encoding="utf-8"?>
 <p:sld xmlns:a="http://schemas.openxmlformats.org/drawingml/2006/main" xmlns:r="http://schemas.openxmlformats.org/officeDocument/2006/relationships" xmlns:p="http://schemas.openxmlformats.org/presentationml/2006/main">
   <p:cSld>
     <p:spTree>
@@ -19213,7 +20816,7 @@
 </p:sld>
 </file>
 
-<file path=ppt/slides/slide23.xml><?xml version="1.0" encoding="utf-8"?>
+<file path=ppt/slides/slide26.xml><?xml version="1.0" encoding="utf-8"?>
 <p:sld xmlns:a="http://schemas.openxmlformats.org/drawingml/2006/main" xmlns:r="http://schemas.openxmlformats.org/officeDocument/2006/relationships" xmlns:p="http://schemas.openxmlformats.org/presentationml/2006/main">
   <p:cSld>
     <p:spTree>
@@ -19272,7 +20875,7 @@
 </p:sld>
 </file>
 
-<file path=ppt/slides/slide24.xml><?xml version="1.0" encoding="utf-8"?>
+<file path=ppt/slides/slide27.xml><?xml version="1.0" encoding="utf-8"?>
 <p:sld xmlns:a="http://schemas.openxmlformats.org/drawingml/2006/main" xmlns:r="http://schemas.openxmlformats.org/officeDocument/2006/relationships" xmlns:p="http://schemas.openxmlformats.org/presentationml/2006/main">
   <p:cSld>
     <p:spTree>
@@ -20639,7 +22242,7 @@
 </p:sld>
 </file>
 
-<file path=ppt/slides/slide25.xml><?xml version="1.0" encoding="utf-8"?>
+<file path=ppt/slides/slide28.xml><?xml version="1.0" encoding="utf-8"?>
 <p:sld xmlns:a="http://schemas.openxmlformats.org/drawingml/2006/main" xmlns:r="http://schemas.openxmlformats.org/officeDocument/2006/relationships" xmlns:p="http://schemas.openxmlformats.org/presentationml/2006/main">
   <p:cSld>
     <p:spTree>
@@ -22304,8 +23907,8 @@
           </a:p>
         </p:txBody>
       </p:sp>
-      <mc:AlternateContent xmlns:mc="http://schemas.openxmlformats.org/markup-compatibility/2006">
-        <mc:Choice xmlns:a14="http://schemas.microsoft.com/office/drawing/2010/main" Requires="a14">
+      <mc:AlternateContent xmlns:mc="http://schemas.openxmlformats.org/markup-compatibility/2006" xmlns:a14="http://schemas.microsoft.com/office/drawing/2010/main">
+        <mc:Choice Requires="a14">
           <p:sp>
             <p:nvSpPr>
               <p:cNvPr id="3" name="Content Placeholder 2">
@@ -22438,7 +24041,7 @@
             </p:txBody>
           </p:sp>
         </mc:Choice>
-        <mc:Fallback>
+        <mc:Fallback xmlns="">
           <p:sp>
             <p:nvSpPr>
               <p:cNvPr id="3" name="Content Placeholder 2">

</xml_diff>